<commit_message>
Datentyp bei Sanierungsauftrag/Gebäude in Text geändert.
</commit_message>
<xml_diff>
--- a/IIB2_UE2_Gruppe01/sql/IIB2_UE2_Gruppe01_RDM_v01.pptx
+++ b/IIB2_UE2_Gruppe01/sql/IIB2_UE2_Gruppe01_RDM_v01.pptx
@@ -241,7 +241,7 @@
           <a:p>
             <a:fld id="{23D3C724-F07E-401D-8666-9B4353F389E1}" type="datetimeFigureOut">
               <a:rPr lang="de-DE" smtClean="0"/>
-              <a:t>16.06.2016</a:t>
+              <a:t>21.06.2016</a:t>
             </a:fld>
             <a:endParaRPr lang="de-DE"/>
           </a:p>
@@ -409,7 +409,7 @@
           <a:p>
             <a:fld id="{23D3C724-F07E-401D-8666-9B4353F389E1}" type="datetimeFigureOut">
               <a:rPr lang="de-DE" smtClean="0"/>
-              <a:t>16.06.2016</a:t>
+              <a:t>21.06.2016</a:t>
             </a:fld>
             <a:endParaRPr lang="de-DE"/>
           </a:p>
@@ -587,7 +587,7 @@
           <a:p>
             <a:fld id="{23D3C724-F07E-401D-8666-9B4353F389E1}" type="datetimeFigureOut">
               <a:rPr lang="de-DE" smtClean="0"/>
-              <a:t>16.06.2016</a:t>
+              <a:t>21.06.2016</a:t>
             </a:fld>
             <a:endParaRPr lang="de-DE"/>
           </a:p>
@@ -755,7 +755,7 @@
           <a:p>
             <a:fld id="{23D3C724-F07E-401D-8666-9B4353F389E1}" type="datetimeFigureOut">
               <a:rPr lang="de-DE" smtClean="0"/>
-              <a:t>16.06.2016</a:t>
+              <a:t>21.06.2016</a:t>
             </a:fld>
             <a:endParaRPr lang="de-DE"/>
           </a:p>
@@ -1000,7 +1000,7 @@
           <a:p>
             <a:fld id="{23D3C724-F07E-401D-8666-9B4353F389E1}" type="datetimeFigureOut">
               <a:rPr lang="de-DE" smtClean="0"/>
-              <a:t>16.06.2016</a:t>
+              <a:t>21.06.2016</a:t>
             </a:fld>
             <a:endParaRPr lang="de-DE"/>
           </a:p>
@@ -1229,7 +1229,7 @@
           <a:p>
             <a:fld id="{23D3C724-F07E-401D-8666-9B4353F389E1}" type="datetimeFigureOut">
               <a:rPr lang="de-DE" smtClean="0"/>
-              <a:t>16.06.2016</a:t>
+              <a:t>21.06.2016</a:t>
             </a:fld>
             <a:endParaRPr lang="de-DE"/>
           </a:p>
@@ -1593,7 +1593,7 @@
           <a:p>
             <a:fld id="{23D3C724-F07E-401D-8666-9B4353F389E1}" type="datetimeFigureOut">
               <a:rPr lang="de-DE" smtClean="0"/>
-              <a:t>16.06.2016</a:t>
+              <a:t>21.06.2016</a:t>
             </a:fld>
             <a:endParaRPr lang="de-DE"/>
           </a:p>
@@ -1710,7 +1710,7 @@
           <a:p>
             <a:fld id="{23D3C724-F07E-401D-8666-9B4353F389E1}" type="datetimeFigureOut">
               <a:rPr lang="de-DE" smtClean="0"/>
-              <a:t>16.06.2016</a:t>
+              <a:t>21.06.2016</a:t>
             </a:fld>
             <a:endParaRPr lang="de-DE"/>
           </a:p>
@@ -1805,7 +1805,7 @@
           <a:p>
             <a:fld id="{23D3C724-F07E-401D-8666-9B4353F389E1}" type="datetimeFigureOut">
               <a:rPr lang="de-DE" smtClean="0"/>
-              <a:t>16.06.2016</a:t>
+              <a:t>21.06.2016</a:t>
             </a:fld>
             <a:endParaRPr lang="de-DE"/>
           </a:p>
@@ -2080,7 +2080,7 @@
           <a:p>
             <a:fld id="{23D3C724-F07E-401D-8666-9B4353F389E1}" type="datetimeFigureOut">
               <a:rPr lang="de-DE" smtClean="0"/>
-              <a:t>16.06.2016</a:t>
+              <a:t>21.06.2016</a:t>
             </a:fld>
             <a:endParaRPr lang="de-DE"/>
           </a:p>
@@ -2332,7 +2332,7 @@
           <a:p>
             <a:fld id="{23D3C724-F07E-401D-8666-9B4353F389E1}" type="datetimeFigureOut">
               <a:rPr lang="de-DE" smtClean="0"/>
-              <a:t>16.06.2016</a:t>
+              <a:t>21.06.2016</a:t>
             </a:fld>
             <a:endParaRPr lang="de-DE"/>
           </a:p>
@@ -2543,7 +2543,7 @@
           <a:p>
             <a:fld id="{23D3C724-F07E-401D-8666-9B4353F389E1}" type="datetimeFigureOut">
               <a:rPr lang="de-DE" smtClean="0"/>
-              <a:t>16.06.2016</a:t>
+              <a:t>21.06.2016</a:t>
             </a:fld>
             <a:endParaRPr lang="de-DE"/>
           </a:p>
@@ -3873,7 +3873,7 @@
           <p:nvPr>
             <p:extLst>
               <p:ext uri="{D42A27DB-BD31-4B8C-83A1-F6EECF244321}">
-                <p14:modId xmlns:p14="http://schemas.microsoft.com/office/powerpoint/2010/main" val="473775600"/>
+                <p14:modId xmlns:p14="http://schemas.microsoft.com/office/powerpoint/2010/main" val="269645166"/>
               </p:ext>
             </p:extLst>
           </p:nvPr>
@@ -4203,12 +4203,16 @@
                     <a:lstStyle/>
                     <a:p>
                       <a:r>
-                        <a:rPr lang="de-DE" sz="1100" dirty="0">
-                          <a:latin typeface="Arial" panose="020B0604020202020204" pitchFamily="34" charset="0"/>
-                          <a:cs typeface="Arial" panose="020B0604020202020204" pitchFamily="34" charset="0"/>
-                        </a:rPr>
-                        <a:t>Long</a:t>
-                      </a:r>
+                        <a:rPr lang="de-DE" sz="1100">
+                          <a:latin typeface="Arial" panose="020B0604020202020204" pitchFamily="34" charset="0"/>
+                          <a:cs typeface="Arial" panose="020B0604020202020204" pitchFamily="34" charset="0"/>
+                        </a:rPr>
+                        <a:t>Text</a:t>
+                      </a:r>
+                      <a:endParaRPr lang="de-DE" sz="1100" dirty="0">
+                        <a:latin typeface="Arial" panose="020B0604020202020204" pitchFamily="34" charset="0"/>
+                        <a:cs typeface="Arial" panose="020B0604020202020204" pitchFamily="34" charset="0"/>
+                      </a:endParaRPr>
                     </a:p>
                   </a:txBody>
                   <a:tcPr/>

</xml_diff>